<commit_message>
added fitPeaks.py for fitting single peaks to the model.
</commit_message>
<xml_diff>
--- a/final/final.pptx
+++ b/final/final.pptx
@@ -12,9 +12,11 @@
     <p:sldId id="259" r:id="rId6"/>
     <p:sldId id="264" r:id="rId7"/>
     <p:sldId id="260" r:id="rId8"/>
-    <p:sldId id="261" r:id="rId9"/>
-    <p:sldId id="262" r:id="rId10"/>
-    <p:sldId id="263" r:id="rId11"/>
+    <p:sldId id="266" r:id="rId9"/>
+    <p:sldId id="267" r:id="rId10"/>
+    <p:sldId id="261" r:id="rId11"/>
+    <p:sldId id="262" r:id="rId12"/>
+    <p:sldId id="263" r:id="rId13"/>
   </p:sldIdLst>
   <p:sldSz cx="12192000" cy="6858000"/>
   <p:notesSz cx="6858000" cy="9144000"/>
@@ -306,7 +308,7 @@
           <a:p>
             <a:fld id="{88D38747-4367-4BD2-8D51-C97E202738E2}" type="datetime1">
               <a:rPr lang="en-US" smtClean="0"/>
-              <a:t>5/7/2024</a:t>
+              <a:t>5/8/2024</a:t>
             </a:fld>
             <a:endParaRPr lang="en-US" dirty="0"/>
           </a:p>
@@ -611,7 +613,7 @@
           <a:p>
             <a:fld id="{11F1B079-7EF0-44EE-B798-BCC497C9F3B2}" type="datetime1">
               <a:rPr lang="en-US" smtClean="0"/>
-              <a:t>5/7/2024</a:t>
+              <a:t>5/8/2024</a:t>
             </a:fld>
             <a:endParaRPr lang="en-US" dirty="0"/>
           </a:p>
@@ -805,7 +807,7 @@
           <a:p>
             <a:fld id="{28FF70A8-1D13-4657-95F0-A9EA54967B8D}" type="datetime1">
               <a:rPr lang="en-US" smtClean="0"/>
-              <a:t>5/7/2024</a:t>
+              <a:t>5/8/2024</a:t>
             </a:fld>
             <a:endParaRPr lang="en-US" dirty="0"/>
           </a:p>
@@ -1068,7 +1070,7 @@
           <a:p>
             <a:fld id="{21EB90AC-71BD-4C7F-8ACA-7B3F18292E63}" type="datetime1">
               <a:rPr lang="en-US" smtClean="0"/>
-              <a:t>5/7/2024</a:t>
+              <a:t>5/8/2024</a:t>
             </a:fld>
             <a:endParaRPr lang="en-US" dirty="0"/>
           </a:p>
@@ -1504,7 +1506,7 @@
           <a:p>
             <a:fld id="{4E6EFC2C-8905-46F0-B443-CE905B76BA01}" type="datetime1">
               <a:rPr lang="en-US" smtClean="0"/>
-              <a:t>5/7/2024</a:t>
+              <a:t>5/8/2024</a:t>
             </a:fld>
             <a:endParaRPr lang="en-US" dirty="0"/>
           </a:p>
@@ -2041,7 +2043,7 @@
           <a:p>
             <a:fld id="{D9079DC3-C9B5-499E-9140-0DC28B7074E2}" type="datetime1">
               <a:rPr lang="en-US" smtClean="0"/>
-              <a:t>5/7/2024</a:t>
+              <a:t>5/8/2024</a:t>
             </a:fld>
             <a:endParaRPr lang="en-US" dirty="0"/>
           </a:p>
@@ -2923,7 +2925,7 @@
           <a:p>
             <a:fld id="{30BB33EA-E472-4D22-9C03-A9C14AA21CED}" type="datetime1">
               <a:rPr lang="en-US" smtClean="0"/>
-              <a:t>5/7/2024</a:t>
+              <a:t>5/8/2024</a:t>
             </a:fld>
             <a:endParaRPr lang="en-US" dirty="0"/>
           </a:p>
@@ -3093,7 +3095,7 @@
           <a:p>
             <a:fld id="{217E833E-1B6D-415F-AD29-75AE8C43BD0D}" type="datetime1">
               <a:rPr lang="en-US" smtClean="0"/>
-              <a:t>5/7/2024</a:t>
+              <a:t>5/8/2024</a:t>
             </a:fld>
             <a:endParaRPr lang="en-US" dirty="0"/>
           </a:p>
@@ -3277,7 +3279,7 @@
           <a:p>
             <a:fld id="{8452596F-08A7-4B70-989A-F2B1CF31E66B}" type="datetime1">
               <a:rPr lang="en-US" smtClean="0"/>
-              <a:t>5/7/2024</a:t>
+              <a:t>5/8/2024</a:t>
             </a:fld>
             <a:endParaRPr lang="en-US" dirty="0"/>
           </a:p>
@@ -3447,7 +3449,7 @@
           <a:p>
             <a:fld id="{73C55A3C-5767-4844-A0A3-83778C2E5409}" type="datetime1">
               <a:rPr lang="en-US" smtClean="0"/>
-              <a:t>5/7/2024</a:t>
+              <a:t>5/8/2024</a:t>
             </a:fld>
             <a:endParaRPr lang="en-US" dirty="0"/>
           </a:p>
@@ -3691,7 +3693,7 @@
           <a:p>
             <a:fld id="{CAE507A8-A5CF-4D38-AB86-7EDDA87A85D4}" type="datetime1">
               <a:rPr lang="en-US" smtClean="0"/>
-              <a:t>5/7/2024</a:t>
+              <a:t>5/8/2024</a:t>
             </a:fld>
             <a:endParaRPr lang="en-US" dirty="0"/>
           </a:p>
@@ -3933,7 +3935,7 @@
           <a:p>
             <a:fld id="{BDFCD27C-8599-43EF-BA1D-14DDC1946E06}" type="datetime1">
               <a:rPr lang="en-US" smtClean="0"/>
-              <a:t>5/7/2024</a:t>
+              <a:t>5/8/2024</a:t>
             </a:fld>
             <a:endParaRPr lang="en-US" dirty="0"/>
           </a:p>
@@ -4414,7 +4416,7 @@
           <a:p>
             <a:fld id="{49343D99-809A-49C0-96E5-4250D0B498EE}" type="datetime1">
               <a:rPr lang="en-US" smtClean="0"/>
-              <a:t>5/7/2024</a:t>
+              <a:t>5/8/2024</a:t>
             </a:fld>
             <a:endParaRPr lang="en-US" dirty="0"/>
           </a:p>
@@ -4532,7 +4534,7 @@
           <a:p>
             <a:fld id="{A143DE9B-B678-4EFB-BB7D-A4370204A0B0}" type="datetime1">
               <a:rPr lang="en-US" smtClean="0"/>
-              <a:t>5/7/2024</a:t>
+              <a:t>5/8/2024</a:t>
             </a:fld>
             <a:endParaRPr lang="en-US" dirty="0"/>
           </a:p>
@@ -4627,7 +4629,7 @@
           <a:p>
             <a:fld id="{E68812DA-F765-4142-A6A3-A8ED7235E082}" type="datetime1">
               <a:rPr lang="en-US" smtClean="0"/>
-              <a:t>5/7/2024</a:t>
+              <a:t>5/8/2024</a:t>
             </a:fld>
             <a:endParaRPr lang="en-US" dirty="0"/>
           </a:p>
@@ -4882,7 +4884,7 @@
           <a:p>
             <a:fld id="{3E0277FD-7DE6-41D4-930D-AC99F5AFE54E}" type="datetime1">
               <a:rPr lang="en-US" smtClean="0"/>
-              <a:t>5/7/2024</a:t>
+              <a:t>5/8/2024</a:t>
             </a:fld>
             <a:endParaRPr lang="en-US" dirty="0"/>
           </a:p>
@@ -5189,7 +5191,7 @@
           <a:p>
             <a:fld id="{9EA15526-7079-4B7B-987C-1B5FAE11A0FF}" type="datetime1">
               <a:rPr lang="en-US" smtClean="0"/>
-              <a:t>5/7/2024</a:t>
+              <a:t>5/8/2024</a:t>
             </a:fld>
             <a:endParaRPr lang="en-US" dirty="0"/>
           </a:p>
@@ -5424,7 +5426,7 @@
           <a:p>
             <a:fld id="{073ED0CC-082F-4160-86E5-0D6041F12778}" type="datetime1">
               <a:rPr lang="en-US" smtClean="0"/>
-              <a:t>5/7/2024</a:t>
+              <a:t>5/8/2024</a:t>
             </a:fld>
             <a:endParaRPr lang="en-US" dirty="0"/>
           </a:p>
@@ -6687,6 +6689,345 @@
           <a:chExt cx="0" cy="0"/>
         </a:xfrm>
       </p:grpSpPr>
+      <p:sp useBgFill="1">
+        <p:nvSpPr>
+          <p:cNvPr id="8" name="Rectangle 7">
+            <a:extLst>
+              <a:ext uri="{FF2B5EF4-FFF2-40B4-BE49-F238E27FC236}">
+                <a16:creationId xmlns:a16="http://schemas.microsoft.com/office/drawing/2014/main" id="{9A6C2C86-63BF-47D5-AA3F-905111A238E2}"/>
+              </a:ext>
+              <a:ext uri="{C183D7F6-B498-43B3-948B-1728B52AA6E4}">
+                <adec:decorative xmlns:adec="http://schemas.microsoft.com/office/drawing/2017/decorative" val="1"/>
+              </a:ext>
+            </a:extLst>
+          </p:cNvPr>
+          <p:cNvSpPr>
+            <a:spLocks noGrp="1" noRot="1" noChangeAspect="1" noMove="1" noResize="1" noEditPoints="1" noAdjustHandles="1" noChangeArrowheads="1" noChangeShapeType="1" noTextEdit="1"/>
+          </p:cNvSpPr>
+          <p:nvPr>
+            <p:extLst>
+              <p:ext uri="{386F3935-93C4-4BCD-93E2-E3B085C9AB24}">
+                <p16:designElem xmlns:p16="http://schemas.microsoft.com/office/powerpoint/2015/main" val="1"/>
+              </p:ext>
+            </p:extLst>
+          </p:nvPr>
+        </p:nvSpPr>
+        <p:spPr>
+          <a:xfrm>
+            <a:off x="0" y="0"/>
+            <a:ext cx="12192000" cy="6858000"/>
+          </a:xfrm>
+          <a:prstGeom prst="rect">
+            <a:avLst/>
+          </a:prstGeom>
+          <a:ln>
+            <a:noFill/>
+          </a:ln>
+        </p:spPr>
+        <p:style>
+          <a:lnRef idx="2">
+            <a:schemeClr val="accent1">
+              <a:shade val="50000"/>
+            </a:schemeClr>
+          </a:lnRef>
+          <a:fillRef idx="1">
+            <a:schemeClr val="accent1"/>
+          </a:fillRef>
+          <a:effectRef idx="0">
+            <a:schemeClr val="accent1"/>
+          </a:effectRef>
+          <a:fontRef idx="minor">
+            <a:schemeClr val="lt1"/>
+          </a:fontRef>
+        </p:style>
+        <p:txBody>
+          <a:bodyPr rtlCol="0" anchor="ctr"/>
+          <a:lstStyle/>
+          <a:p>
+            <a:pPr algn="ctr"/>
+            <a:endParaRPr lang="en-US"/>
+          </a:p>
+        </p:txBody>
+      </p:sp>
+      <p:sp>
+        <p:nvSpPr>
+          <p:cNvPr id="2" name="Başlık 1">
+            <a:extLst>
+              <a:ext uri="{FF2B5EF4-FFF2-40B4-BE49-F238E27FC236}">
+                <a16:creationId xmlns:a16="http://schemas.microsoft.com/office/drawing/2014/main" id="{0156A4BB-940A-D45F-952D-D659E5394E5B}"/>
+              </a:ext>
+            </a:extLst>
+          </p:cNvPr>
+          <p:cNvSpPr>
+            <a:spLocks noGrp="1"/>
+          </p:cNvSpPr>
+          <p:nvPr>
+            <p:ph type="title"/>
+          </p:nvPr>
+        </p:nvSpPr>
+        <p:spPr>
+          <a:xfrm>
+            <a:off x="243194" y="173736"/>
+            <a:ext cx="7393017" cy="941832"/>
+          </a:xfrm>
+        </p:spPr>
+        <p:txBody>
+          <a:bodyPr>
+            <a:normAutofit fontScale="90000"/>
+          </a:bodyPr>
+          <a:lstStyle/>
+          <a:p>
+            <a:pPr algn="l"/>
+            <a:r>
+              <a:rPr lang="en-US" sz="4800" dirty="0"/>
+              <a:t>Future implementations</a:t>
+            </a:r>
+          </a:p>
+        </p:txBody>
+      </p:sp>
+      <p:cxnSp>
+        <p:nvCxnSpPr>
+          <p:cNvPr id="10" name="Straight Connector 9">
+            <a:extLst>
+              <a:ext uri="{FF2B5EF4-FFF2-40B4-BE49-F238E27FC236}">
+                <a16:creationId xmlns:a16="http://schemas.microsoft.com/office/drawing/2014/main" id="{425A0768-3044-4AA9-A889-D2CAA68C517A}"/>
+              </a:ext>
+              <a:ext uri="{C183D7F6-B498-43B3-948B-1728B52AA6E4}">
+                <adec:decorative xmlns:adec="http://schemas.microsoft.com/office/drawing/2017/decorative" val="1"/>
+              </a:ext>
+            </a:extLst>
+          </p:cNvPr>
+          <p:cNvCxnSpPr>
+            <a:cxnSpLocks noGrp="1" noRot="1" noChangeAspect="1" noMove="1" noResize="1" noEditPoints="1" noAdjustHandles="1" noChangeArrowheads="1" noChangeShapeType="1"/>
+          </p:cNvCxnSpPr>
+          <p:nvPr>
+            <p:extLst>
+              <p:ext uri="{386F3935-93C4-4BCD-93E2-E3B085C9AB24}">
+                <p16:designElem xmlns:p16="http://schemas.microsoft.com/office/powerpoint/2015/main" val="1"/>
+              </p:ext>
+            </p:extLst>
+          </p:nvPr>
+        </p:nvCxnSpPr>
+        <p:spPr>
+          <a:xfrm>
+            <a:off x="4654605" y="2057400"/>
+            <a:ext cx="0" cy="2743200"/>
+          </a:xfrm>
+          <a:prstGeom prst="line">
+            <a:avLst/>
+          </a:prstGeom>
+          <a:ln w="19050">
+            <a:solidFill>
+              <a:schemeClr val="tx2"/>
+            </a:solidFill>
+          </a:ln>
+        </p:spPr>
+        <p:style>
+          <a:lnRef idx="1">
+            <a:schemeClr val="accent1"/>
+          </a:lnRef>
+          <a:fillRef idx="0">
+            <a:schemeClr val="accent1"/>
+          </a:fillRef>
+          <a:effectRef idx="0">
+            <a:schemeClr val="accent1"/>
+          </a:effectRef>
+          <a:fontRef idx="minor">
+            <a:schemeClr val="tx1"/>
+          </a:fontRef>
+        </p:style>
+      </p:cxnSp>
+      <p:sp>
+        <p:nvSpPr>
+          <p:cNvPr id="3" name="İçerik Yer Tutucusu 2">
+            <a:extLst>
+              <a:ext uri="{FF2B5EF4-FFF2-40B4-BE49-F238E27FC236}">
+                <a16:creationId xmlns:a16="http://schemas.microsoft.com/office/drawing/2014/main" id="{C46C0C0E-6C36-3332-D7B5-2A6E69D7AB3D}"/>
+              </a:ext>
+            </a:extLst>
+          </p:cNvPr>
+          <p:cNvSpPr>
+            <a:spLocks noGrp="1"/>
+          </p:cNvSpPr>
+          <p:nvPr>
+            <p:ph idx="1"/>
+          </p:nvPr>
+        </p:nvSpPr>
+        <p:spPr>
+          <a:xfrm>
+            <a:off x="5105398" y="1115568"/>
+            <a:ext cx="6245352" cy="4626864"/>
+          </a:xfrm>
+        </p:spPr>
+        <p:txBody>
+          <a:bodyPr anchor="ctr">
+            <a:normAutofit/>
+          </a:bodyPr>
+          <a:lstStyle/>
+          <a:p>
+            <a:r>
+              <a:rPr lang="tr-TR" dirty="0" err="1"/>
+              <a:t>Kuntz</a:t>
+            </a:r>
+            <a:r>
+              <a:rPr lang="tr-TR" dirty="0"/>
+              <a:t> </a:t>
+            </a:r>
+            <a:r>
+              <a:rPr lang="tr-TR" dirty="0" err="1"/>
+              <a:t>Paper</a:t>
+            </a:r>
+            <a:endParaRPr lang="en-US" dirty="0"/>
+          </a:p>
+        </p:txBody>
+      </p:sp>
+    </p:spTree>
+    <p:extLst>
+      <p:ext uri="{BB962C8B-B14F-4D97-AF65-F5344CB8AC3E}">
+        <p14:creationId xmlns:p14="http://schemas.microsoft.com/office/powerpoint/2010/main" val="3985868732"/>
+      </p:ext>
+    </p:extLst>
+  </p:cSld>
+  <p:clrMapOvr>
+    <a:masterClrMapping/>
+  </p:clrMapOvr>
+</p:sld>
+</file>
+
+<file path=ppt/slides/slide11.xml><?xml version="1.0" encoding="utf-8"?>
+<p:sld xmlns:a="http://schemas.openxmlformats.org/drawingml/2006/main" xmlns:r="http://schemas.openxmlformats.org/officeDocument/2006/relationships" xmlns:p="http://schemas.openxmlformats.org/presentationml/2006/main">
+  <p:cSld>
+    <p:spTree>
+      <p:nvGrpSpPr>
+        <p:cNvPr id="1" name=""/>
+        <p:cNvGrpSpPr/>
+        <p:nvPr/>
+      </p:nvGrpSpPr>
+      <p:grpSpPr>
+        <a:xfrm>
+          <a:off x="0" y="0"/>
+          <a:ext cx="0" cy="0"/>
+          <a:chOff x="0" y="0"/>
+          <a:chExt cx="0" cy="0"/>
+        </a:xfrm>
+      </p:grpSpPr>
+      <p:sp>
+        <p:nvSpPr>
+          <p:cNvPr id="2" name="Başlık 1">
+            <a:extLst>
+              <a:ext uri="{FF2B5EF4-FFF2-40B4-BE49-F238E27FC236}">
+                <a16:creationId xmlns:a16="http://schemas.microsoft.com/office/drawing/2014/main" id="{0156A4BB-940A-D45F-952D-D659E5394E5B}"/>
+              </a:ext>
+            </a:extLst>
+          </p:cNvPr>
+          <p:cNvSpPr>
+            <a:spLocks noGrp="1"/>
+          </p:cNvSpPr>
+          <p:nvPr>
+            <p:ph type="title"/>
+          </p:nvPr>
+        </p:nvSpPr>
+        <p:spPr>
+          <a:xfrm>
+            <a:off x="834013" y="1115568"/>
+            <a:ext cx="3487616" cy="4626864"/>
+          </a:xfrm>
+        </p:spPr>
+        <p:txBody>
+          <a:bodyPr>
+            <a:normAutofit/>
+          </a:bodyPr>
+          <a:lstStyle/>
+          <a:p>
+            <a:pPr algn="l"/>
+            <a:r>
+              <a:rPr lang="en-US" sz="3600" dirty="0"/>
+              <a:t>Conclusion</a:t>
+            </a:r>
+          </a:p>
+        </p:txBody>
+      </p:sp>
+      <p:sp>
+        <p:nvSpPr>
+          <p:cNvPr id="3" name="İçerik Yer Tutucusu 2">
+            <a:extLst>
+              <a:ext uri="{FF2B5EF4-FFF2-40B4-BE49-F238E27FC236}">
+                <a16:creationId xmlns:a16="http://schemas.microsoft.com/office/drawing/2014/main" id="{C46C0C0E-6C36-3332-D7B5-2A6E69D7AB3D}"/>
+              </a:ext>
+            </a:extLst>
+          </p:cNvPr>
+          <p:cNvSpPr>
+            <a:spLocks noGrp="1"/>
+          </p:cNvSpPr>
+          <p:nvPr>
+            <p:ph idx="1"/>
+          </p:nvPr>
+        </p:nvSpPr>
+        <p:spPr>
+          <a:xfrm>
+            <a:off x="5105398" y="1115568"/>
+            <a:ext cx="6245352" cy="4626864"/>
+          </a:xfrm>
+        </p:spPr>
+        <p:txBody>
+          <a:bodyPr anchor="ctr">
+            <a:normAutofit/>
+          </a:bodyPr>
+          <a:lstStyle/>
+          <a:p>
+            <a:endParaRPr lang="en-US"/>
+          </a:p>
+        </p:txBody>
+      </p:sp>
+    </p:spTree>
+    <p:extLst>
+      <p:ext uri="{BB962C8B-B14F-4D97-AF65-F5344CB8AC3E}">
+        <p14:creationId xmlns:p14="http://schemas.microsoft.com/office/powerpoint/2010/main" val="3032394955"/>
+      </p:ext>
+    </p:extLst>
+  </p:cSld>
+  <p:clrMapOvr>
+    <a:masterClrMapping/>
+  </p:clrMapOvr>
+</p:sld>
+</file>
+
+<file path=ppt/slides/slide12.xml><?xml version="1.0" encoding="utf-8"?>
+<p:sld xmlns:a="http://schemas.openxmlformats.org/drawingml/2006/main" xmlns:r="http://schemas.openxmlformats.org/officeDocument/2006/relationships" xmlns:p="http://schemas.openxmlformats.org/presentationml/2006/main">
+  <p:cSld>
+    <p:bg>
+      <p:bgPr>
+        <a:blipFill rotWithShape="1">
+          <a:blip r:embed="rId2">
+            <a:duotone>
+              <a:schemeClr val="bg1">
+                <a:shade val="80000"/>
+                <a:lumMod val="80000"/>
+              </a:schemeClr>
+              <a:schemeClr val="bg1">
+                <a:tint val="98000"/>
+              </a:schemeClr>
+            </a:duotone>
+          </a:blip>
+          <a:stretch/>
+        </a:blipFill>
+        <a:effectLst/>
+      </p:bgPr>
+    </p:bg>
+    <p:spTree>
+      <p:nvGrpSpPr>
+        <p:cNvPr id="1" name=""/>
+        <p:cNvGrpSpPr/>
+        <p:nvPr/>
+      </p:nvGrpSpPr>
+      <p:grpSpPr>
+        <a:xfrm>
+          <a:off x="0" y="0"/>
+          <a:ext cx="0" cy="0"/>
+          <a:chOff x="0" y="0"/>
+          <a:chExt cx="0" cy="0"/>
+        </a:xfrm>
+      </p:grpSpPr>
       <p:sp>
         <p:nvSpPr>
           <p:cNvPr id="22" name="Rectangle 15">
@@ -7259,13 +7600,8 @@
           <a:p>
             <a:r>
               <a:rPr lang="en-US" dirty="0"/>
-              <a:t>Future </a:t>
-            </a:r>
-            <a:r>
-              <a:rPr lang="tr-TR" dirty="0" err="1"/>
-              <a:t>direction</a:t>
-            </a:r>
-            <a:endParaRPr lang="en-US" dirty="0"/>
+              <a:t>Future direction</a:t>
+            </a:r>
           </a:p>
           <a:p>
             <a:r>
@@ -7329,10 +7665,10 @@
       </p:grpSpPr>
       <p:sp useBgFill="1">
         <p:nvSpPr>
-          <p:cNvPr id="14" name="Rectangle 7">
+          <p:cNvPr id="21" name="Rectangle 20">
             <a:extLst>
               <a:ext uri="{FF2B5EF4-FFF2-40B4-BE49-F238E27FC236}">
-                <a16:creationId xmlns:a16="http://schemas.microsoft.com/office/drawing/2014/main" id="{9A6C2C86-63BF-47D5-AA3F-905111A238E2}"/>
+                <a16:creationId xmlns:a16="http://schemas.microsoft.com/office/drawing/2014/main" id="{D98318E6-69F4-42F4-AB85-F01AA0DAF3A4}"/>
               </a:ext>
               <a:ext uri="{C183D7F6-B498-43B3-948B-1728B52AA6E4}">
                 <adec:decorative xmlns:adec="http://schemas.microsoft.com/office/drawing/2017/decorative" val="1"/>
@@ -7405,8 +7741,8 @@
         </p:nvSpPr>
         <p:spPr>
           <a:xfrm>
-            <a:off x="834013" y="1115568"/>
-            <a:ext cx="3487616" cy="4626864"/>
+            <a:off x="5146160" y="609599"/>
+            <a:ext cx="5978072" cy="1505804"/>
           </a:xfrm>
         </p:spPr>
         <p:txBody>
@@ -7415,29 +7751,57 @@
           </a:bodyPr>
           <a:lstStyle/>
           <a:p>
-            <a:pPr algn="l"/>
-            <a:r>
-              <a:rPr lang="en-US" sz="3600"/>
+            <a:r>
+              <a:rPr lang="en-US" sz="3700"/>
               <a:t>Spontaneous oscillations in Astrocytes</a:t>
             </a:r>
           </a:p>
         </p:txBody>
       </p:sp>
-      <p:cxnSp>
-        <p:nvCxnSpPr>
-          <p:cNvPr id="15" name="Straight Connector 9">
+      <p:pic>
+        <p:nvPicPr>
+          <p:cNvPr id="17" name="Picture 16" descr="Neuron system in 3D rendering">
             <a:extLst>
               <a:ext uri="{FF2B5EF4-FFF2-40B4-BE49-F238E27FC236}">
-                <a16:creationId xmlns:a16="http://schemas.microsoft.com/office/drawing/2014/main" id="{425A0768-3044-4AA9-A889-D2CAA68C517A}"/>
+                <a16:creationId xmlns:a16="http://schemas.microsoft.com/office/drawing/2014/main" id="{84B1A9D4-BD59-CB50-8C38-30BC0A7FA401}"/>
+              </a:ext>
+            </a:extLst>
+          </p:cNvPr>
+          <p:cNvPicPr>
+            <a:picLocks noChangeAspect="1"/>
+          </p:cNvPicPr>
+          <p:nvPr/>
+        </p:nvPicPr>
+        <p:blipFill rotWithShape="1">
+          <a:blip r:embed="rId3"/>
+          <a:srcRect l="35443" r="19393" b="-1"/>
+          <a:stretch/>
+        </p:blipFill>
+        <p:spPr>
+          <a:xfrm>
+            <a:off x="-10649" y="1"/>
+            <a:ext cx="4571649" cy="6858000"/>
+          </a:xfrm>
+          <a:prstGeom prst="rect">
+            <a:avLst/>
+          </a:prstGeom>
+        </p:spPr>
+      </p:pic>
+      <p:pic>
+        <p:nvPicPr>
+          <p:cNvPr id="23" name="Picture 22">
+            <a:extLst>
+              <a:ext uri="{FF2B5EF4-FFF2-40B4-BE49-F238E27FC236}">
+                <a16:creationId xmlns:a16="http://schemas.microsoft.com/office/drawing/2014/main" id="{559DF61F-9058-49C9-8F75-DC501F983B0E}"/>
               </a:ext>
               <a:ext uri="{C183D7F6-B498-43B3-948B-1728B52AA6E4}">
                 <adec:decorative xmlns:adec="http://schemas.microsoft.com/office/drawing/2017/decorative" val="1"/>
               </a:ext>
             </a:extLst>
           </p:cNvPr>
-          <p:cNvCxnSpPr>
-            <a:cxnSpLocks noGrp="1" noRot="1" noChangeAspect="1" noMove="1" noResize="1" noEditPoints="1" noAdjustHandles="1" noChangeArrowheads="1" noChangeShapeType="1"/>
-          </p:cNvCxnSpPr>
+          <p:cNvPicPr>
+            <a:picLocks noGrp="1" noRot="1" noChangeAspect="1" noMove="1" noResize="1" noEditPoints="1" noAdjustHandles="1" noChangeArrowheads="1" noChangeShapeType="1" noCrop="1"/>
+          </p:cNvPicPr>
           <p:nvPr>
             <p:extLst>
               <p:ext uri="{386F3935-93C4-4BCD-93E2-E3B085C9AB24}">
@@ -7445,36 +7809,28 @@
               </p:ext>
             </p:extLst>
           </p:nvPr>
-        </p:nvCxnSpPr>
-        <p:spPr>
-          <a:xfrm>
-            <a:off x="4654605" y="2057400"/>
-            <a:ext cx="0" cy="2743200"/>
-          </a:xfrm>
-          <a:prstGeom prst="line">
+        </p:nvPicPr>
+        <p:blipFill rotWithShape="1">
+          <a:blip r:embed="rId4">
+            <a:extLst>
+              <a:ext uri="{28A0092B-C50C-407E-A947-70E740481C1C}">
+                <a14:useLocalDpi xmlns:a14="http://schemas.microsoft.com/office/drawing/2010/main" val="0"/>
+              </a:ext>
+            </a:extLst>
+          </a:blip>
+          <a:srcRect t="964" r="2807" b="1446"/>
+          <a:stretch/>
+        </p:blipFill>
+        <p:spPr>
+          <a:xfrm>
+            <a:off x="-10649" y="1"/>
+            <a:ext cx="4690532" cy="6858000"/>
+          </a:xfrm>
+          <a:prstGeom prst="rect">
             <a:avLst/>
           </a:prstGeom>
-          <a:ln w="19050">
-            <a:solidFill>
-              <a:schemeClr val="tx2"/>
-            </a:solidFill>
-          </a:ln>
-        </p:spPr>
-        <p:style>
-          <a:lnRef idx="1">
-            <a:schemeClr val="accent1"/>
-          </a:lnRef>
-          <a:fillRef idx="0">
-            <a:schemeClr val="accent1"/>
-          </a:fillRef>
-          <a:effectRef idx="0">
-            <a:schemeClr val="accent1"/>
-          </a:effectRef>
-          <a:fontRef idx="minor">
-            <a:schemeClr val="tx1"/>
-          </a:fontRef>
-        </p:style>
-      </p:cxnSp>
+        </p:spPr>
+      </p:pic>
       <p:sp>
         <p:nvSpPr>
           <p:cNvPr id="3" name="İçerik Yer Tutucusu 2">
@@ -7493,8 +7849,8 @@
         </p:nvSpPr>
         <p:spPr>
           <a:xfrm>
-            <a:off x="5105398" y="1115568"/>
-            <a:ext cx="6245352" cy="4626864"/>
+            <a:off x="5146160" y="2286000"/>
+            <a:ext cx="5978072" cy="3477088"/>
           </a:xfrm>
         </p:spPr>
         <p:txBody>
@@ -7508,10 +7864,10 @@
               <a:buChar char="•"/>
             </a:pPr>
             <a:r>
-              <a:rPr lang="en-US" sz="2000" dirty="0"/>
+              <a:rPr lang="en-US"/>
               <a:t>Brief Overview:</a:t>
             </a:r>
-            <a:endParaRPr lang="tr-TR" sz="2000" dirty="0"/>
+            <a:endParaRPr lang="tr-TR"/>
           </a:p>
           <a:p>
             <a:pPr lvl="1">
@@ -7519,7 +7875,7 @@
               <a:buChar char="•"/>
             </a:pPr>
             <a:r>
-              <a:rPr lang="en-US" sz="1800" dirty="0"/>
+              <a:rPr lang="en-US"/>
               <a:t>Astrocytes: Often overlooked, but crucial support cells in the brain.</a:t>
             </a:r>
           </a:p>
@@ -7529,10 +7885,10 @@
               <a:buChar char="•"/>
             </a:pPr>
             <a:r>
-              <a:rPr lang="en-US" sz="1800" dirty="0"/>
+              <a:rPr lang="en-US"/>
               <a:t>Spontaneous Oscillations: Intriguing rhythmic patterns in astrocyte activity.</a:t>
             </a:r>
-            <a:endParaRPr lang="tr-TR" sz="1800" dirty="0"/>
+            <a:endParaRPr lang="tr-TR"/>
           </a:p>
           <a:p>
             <a:pPr lvl="1">
@@ -7540,7 +7896,7 @@
               <a:buChar char="•"/>
             </a:pPr>
             <a:r>
-              <a:rPr lang="en-US" sz="1800" dirty="0"/>
+              <a:rPr lang="en-US"/>
               <a:t>Understanding astrocytic oscillations can unravel mysteries surrounding neural network behavior and information processing in the brain.</a:t>
             </a:r>
           </a:p>
@@ -7568,6 +7924,25 @@
 <file path=ppt/slides/slide4.xml><?xml version="1.0" encoding="utf-8"?>
 <p:sld xmlns:a="http://schemas.openxmlformats.org/drawingml/2006/main" xmlns:r="http://schemas.openxmlformats.org/officeDocument/2006/relationships" xmlns:p="http://schemas.openxmlformats.org/presentationml/2006/main">
   <p:cSld>
+    <p:bg>
+      <p:bgPr>
+        <a:blipFill rotWithShape="1">
+          <a:blip r:embed="rId2">
+            <a:duotone>
+              <a:schemeClr val="bg1">
+                <a:shade val="80000"/>
+                <a:lumMod val="80000"/>
+              </a:schemeClr>
+              <a:schemeClr val="bg1">
+                <a:tint val="98000"/>
+              </a:schemeClr>
+            </a:duotone>
+          </a:blip>
+          <a:stretch/>
+        </a:blipFill>
+        <a:effectLst/>
+      </p:bgPr>
+    </p:bg>
     <p:spTree>
       <p:nvGrpSpPr>
         <p:cNvPr id="1" name=""/>
@@ -7582,6 +7957,66 @@
           <a:chExt cx="0" cy="0"/>
         </a:xfrm>
       </p:grpSpPr>
+      <p:sp useBgFill="1">
+        <p:nvSpPr>
+          <p:cNvPr id="9" name="Rectangle 8">
+            <a:extLst>
+              <a:ext uri="{FF2B5EF4-FFF2-40B4-BE49-F238E27FC236}">
+                <a16:creationId xmlns:a16="http://schemas.microsoft.com/office/drawing/2014/main" id="{D98318E6-69F4-42F4-AB85-F01AA0DAF3A4}"/>
+              </a:ext>
+              <a:ext uri="{C183D7F6-B498-43B3-948B-1728B52AA6E4}">
+                <adec:decorative xmlns:adec="http://schemas.microsoft.com/office/drawing/2017/decorative" val="1"/>
+              </a:ext>
+            </a:extLst>
+          </p:cNvPr>
+          <p:cNvSpPr>
+            <a:spLocks noGrp="1" noRot="1" noChangeAspect="1" noMove="1" noResize="1" noEditPoints="1" noAdjustHandles="1" noChangeArrowheads="1" noChangeShapeType="1" noTextEdit="1"/>
+          </p:cNvSpPr>
+          <p:nvPr>
+            <p:extLst>
+              <p:ext uri="{386F3935-93C4-4BCD-93E2-E3B085C9AB24}">
+                <p16:designElem xmlns:p16="http://schemas.microsoft.com/office/powerpoint/2015/main" val="1"/>
+              </p:ext>
+            </p:extLst>
+          </p:nvPr>
+        </p:nvSpPr>
+        <p:spPr>
+          <a:xfrm>
+            <a:off x="0" y="0"/>
+            <a:ext cx="12192000" cy="6858000"/>
+          </a:xfrm>
+          <a:prstGeom prst="rect">
+            <a:avLst/>
+          </a:prstGeom>
+          <a:ln>
+            <a:noFill/>
+          </a:ln>
+        </p:spPr>
+        <p:style>
+          <a:lnRef idx="2">
+            <a:schemeClr val="accent1">
+              <a:shade val="50000"/>
+            </a:schemeClr>
+          </a:lnRef>
+          <a:fillRef idx="1">
+            <a:schemeClr val="accent1"/>
+          </a:fillRef>
+          <a:effectRef idx="0">
+            <a:schemeClr val="accent1"/>
+          </a:effectRef>
+          <a:fontRef idx="minor">
+            <a:schemeClr val="lt1"/>
+          </a:fontRef>
+        </p:style>
+        <p:txBody>
+          <a:bodyPr rtlCol="0" anchor="ctr"/>
+          <a:lstStyle/>
+          <a:p>
+            <a:pPr algn="ctr"/>
+            <a:endParaRPr lang="en-US"/>
+          </a:p>
+        </p:txBody>
+      </p:sp>
       <p:sp>
         <p:nvSpPr>
           <p:cNvPr id="2" name="Başlık 1">
@@ -7600,8 +8035,8 @@
         </p:nvSpPr>
         <p:spPr>
           <a:xfrm>
-            <a:off x="834013" y="1115568"/>
-            <a:ext cx="3487616" cy="4626864"/>
+            <a:off x="5146160" y="609599"/>
+            <a:ext cx="5978072" cy="1505804"/>
           </a:xfrm>
         </p:spPr>
         <p:txBody>
@@ -7610,14 +8045,86 @@
           </a:bodyPr>
           <a:lstStyle/>
           <a:p>
-            <a:pPr algn="l"/>
-            <a:r>
-              <a:rPr lang="en-US" sz="3600"/>
+            <a:r>
+              <a:rPr lang="en-US" sz="3700"/>
               <a:t>Spontaneous oscillations in Astrocytes</a:t>
             </a:r>
           </a:p>
         </p:txBody>
       </p:sp>
+      <p:pic>
+        <p:nvPicPr>
+          <p:cNvPr id="5" name="Picture 4" descr="3D neurons connecting">
+            <a:extLst>
+              <a:ext uri="{FF2B5EF4-FFF2-40B4-BE49-F238E27FC236}">
+                <a16:creationId xmlns:a16="http://schemas.microsoft.com/office/drawing/2014/main" id="{97B2045F-31E2-2F91-95BE-B90794E62097}"/>
+              </a:ext>
+            </a:extLst>
+          </p:cNvPr>
+          <p:cNvPicPr>
+            <a:picLocks noChangeAspect="1"/>
+          </p:cNvPicPr>
+          <p:nvPr/>
+        </p:nvPicPr>
+        <p:blipFill rotWithShape="1">
+          <a:blip r:embed="rId3"/>
+          <a:srcRect l="26025" r="29478" b="-2"/>
+          <a:stretch/>
+        </p:blipFill>
+        <p:spPr>
+          <a:xfrm>
+            <a:off x="-10649" y="1"/>
+            <a:ext cx="4571649" cy="6858000"/>
+          </a:xfrm>
+          <a:prstGeom prst="rect">
+            <a:avLst/>
+          </a:prstGeom>
+        </p:spPr>
+      </p:pic>
+      <p:pic>
+        <p:nvPicPr>
+          <p:cNvPr id="11" name="Picture 10">
+            <a:extLst>
+              <a:ext uri="{FF2B5EF4-FFF2-40B4-BE49-F238E27FC236}">
+                <a16:creationId xmlns:a16="http://schemas.microsoft.com/office/drawing/2014/main" id="{559DF61F-9058-49C9-8F75-DC501F983B0E}"/>
+              </a:ext>
+              <a:ext uri="{C183D7F6-B498-43B3-948B-1728B52AA6E4}">
+                <adec:decorative xmlns:adec="http://schemas.microsoft.com/office/drawing/2017/decorative" val="1"/>
+              </a:ext>
+            </a:extLst>
+          </p:cNvPr>
+          <p:cNvPicPr>
+            <a:picLocks noGrp="1" noRot="1" noChangeAspect="1" noMove="1" noResize="1" noEditPoints="1" noAdjustHandles="1" noChangeArrowheads="1" noChangeShapeType="1" noCrop="1"/>
+          </p:cNvPicPr>
+          <p:nvPr>
+            <p:extLst>
+              <p:ext uri="{386F3935-93C4-4BCD-93E2-E3B085C9AB24}">
+                <p16:designElem xmlns:p16="http://schemas.microsoft.com/office/powerpoint/2015/main" val="1"/>
+              </p:ext>
+            </p:extLst>
+          </p:nvPr>
+        </p:nvPicPr>
+        <p:blipFill rotWithShape="1">
+          <a:blip r:embed="rId4">
+            <a:extLst>
+              <a:ext uri="{28A0092B-C50C-407E-A947-70E740481C1C}">
+                <a14:useLocalDpi xmlns:a14="http://schemas.microsoft.com/office/drawing/2010/main" val="0"/>
+              </a:ext>
+            </a:extLst>
+          </a:blip>
+          <a:srcRect t="964" r="2807" b="1446"/>
+          <a:stretch/>
+        </p:blipFill>
+        <p:spPr>
+          <a:xfrm>
+            <a:off x="-10649" y="1"/>
+            <a:ext cx="4690532" cy="6858000"/>
+          </a:xfrm>
+          <a:prstGeom prst="rect">
+            <a:avLst/>
+          </a:prstGeom>
+        </p:spPr>
+      </p:pic>
       <p:sp>
         <p:nvSpPr>
           <p:cNvPr id="3" name="İçerik Yer Tutucusu 2">
@@ -7636,8 +8143,8 @@
         </p:nvSpPr>
         <p:spPr>
           <a:xfrm>
-            <a:off x="5105398" y="1115568"/>
-            <a:ext cx="6245352" cy="4626864"/>
+            <a:off x="5146160" y="2286000"/>
+            <a:ext cx="5978072" cy="3477088"/>
           </a:xfrm>
         </p:spPr>
         <p:txBody>
@@ -7823,13 +8330,13 @@
           <a:p>
             <a:pPr algn="l"/>
             <a:r>
-              <a:rPr lang="en-US" sz="3600" dirty="0"/>
+              <a:rPr lang="en-US" sz="5400" dirty="0"/>
               <a:t>Data and Model</a:t>
             </a:r>
             <a:br>
-              <a:rPr lang="en-US" sz="3600" dirty="0"/>
+              <a:rPr lang="en-US" sz="5400" dirty="0"/>
             </a:br>
-            <a:endParaRPr lang="en-US" sz="3600" dirty="0"/>
+            <a:endParaRPr lang="en-US" sz="5400" dirty="0"/>
           </a:p>
         </p:txBody>
       </p:sp>
@@ -8056,13 +8563,13 @@
           <a:p>
             <a:pPr algn="l"/>
             <a:r>
-              <a:rPr lang="en-US" sz="3600" dirty="0"/>
+              <a:rPr lang="en-US" sz="5400" dirty="0"/>
               <a:t>Data and Model</a:t>
             </a:r>
             <a:br>
-              <a:rPr lang="en-US" sz="3600" dirty="0"/>
+              <a:rPr lang="en-US" sz="5400" dirty="0"/>
             </a:br>
-            <a:endParaRPr lang="en-US" sz="3600" dirty="0"/>
+            <a:endParaRPr lang="en-US" sz="5400" dirty="0"/>
           </a:p>
         </p:txBody>
       </p:sp>
@@ -8289,13 +8796,13 @@
           <a:p>
             <a:pPr algn="l"/>
             <a:r>
-              <a:rPr lang="en-US" sz="3600" dirty="0"/>
+              <a:rPr lang="en-US" sz="5400" dirty="0"/>
               <a:t>How to fit?</a:t>
             </a:r>
             <a:br>
-              <a:rPr lang="en-US" sz="3600" dirty="0"/>
+              <a:rPr lang="en-US" sz="5400" dirty="0"/>
             </a:br>
-            <a:endParaRPr lang="en-US" sz="3600" dirty="0"/>
+            <a:endParaRPr lang="en-US" sz="5400" dirty="0"/>
           </a:p>
         </p:txBody>
       </p:sp>
@@ -8379,7 +8886,52 @@
           </a:bodyPr>
           <a:lstStyle/>
           <a:p>
-            <a:endParaRPr lang="en-US"/>
+            <a:pPr marL="36900" indent="0">
+              <a:buNone/>
+            </a:pPr>
+            <a:r>
+              <a:rPr lang="en-US" dirty="0"/>
+              <a:t>We have two options:</a:t>
+            </a:r>
+          </a:p>
+          <a:p>
+            <a:pPr marL="36900" indent="0">
+              <a:buNone/>
+            </a:pPr>
+            <a:r>
+              <a:rPr lang="en-US" dirty="0"/>
+              <a:t>1- Looking at</a:t>
+            </a:r>
+            <a:r>
+              <a:rPr lang="tr-TR" dirty="0"/>
+              <a:t> </a:t>
+            </a:r>
+            <a:r>
+              <a:rPr lang="en-US" dirty="0"/>
+              <a:t>single peak</a:t>
+            </a:r>
+            <a:r>
+              <a:rPr lang="tr-TR" dirty="0"/>
+              <a:t>s</a:t>
+            </a:r>
+            <a:endParaRPr lang="en-US" dirty="0"/>
+          </a:p>
+          <a:p>
+            <a:pPr marL="36900" indent="0">
+              <a:buNone/>
+            </a:pPr>
+            <a:r>
+              <a:rPr lang="en-US" dirty="0"/>
+              <a:t>2-</a:t>
+            </a:r>
+            <a:r>
+              <a:rPr lang="tr-TR" dirty="0"/>
+              <a:t> Using </a:t>
+            </a:r>
+            <a:r>
+              <a:rPr lang="en-US" dirty="0"/>
+              <a:t>Taken’s Embedding </a:t>
+            </a:r>
           </a:p>
         </p:txBody>
       </p:sp>
@@ -8497,7 +9049,7 @@
           <p:cNvPr id="2" name="Başlık 1">
             <a:extLst>
               <a:ext uri="{FF2B5EF4-FFF2-40B4-BE49-F238E27FC236}">
-                <a16:creationId xmlns:a16="http://schemas.microsoft.com/office/drawing/2014/main" id="{0156A4BB-940A-D45F-952D-D659E5394E5B}"/>
+                <a16:creationId xmlns:a16="http://schemas.microsoft.com/office/drawing/2014/main" id="{B6FFF6DC-56D6-C674-9CAC-2D22A647FA25}"/>
               </a:ext>
             </a:extLst>
           </p:cNvPr>
@@ -8510,8 +9062,8 @@
         </p:nvSpPr>
         <p:spPr>
           <a:xfrm>
-            <a:off x="834013" y="1115568"/>
-            <a:ext cx="3487616" cy="4626864"/>
+            <a:off x="0" y="0"/>
+            <a:ext cx="7424771" cy="1647087"/>
           </a:xfrm>
         </p:spPr>
         <p:txBody>
@@ -8522,8 +9074,8 @@
           <a:p>
             <a:pPr algn="l"/>
             <a:r>
-              <a:rPr lang="en-US" sz="3100"/>
-              <a:t>Future implementations</a:t>
+              <a:rPr lang="en-US" dirty="0"/>
+              <a:t>Looking at single peaks</a:t>
             </a:r>
           </a:p>
         </p:txBody>
@@ -8585,7 +9137,7 @@
           <p:cNvPr id="3" name="İçerik Yer Tutucusu 2">
             <a:extLst>
               <a:ext uri="{FF2B5EF4-FFF2-40B4-BE49-F238E27FC236}">
-                <a16:creationId xmlns:a16="http://schemas.microsoft.com/office/drawing/2014/main" id="{C46C0C0E-6C36-3332-D7B5-2A6E69D7AB3D}"/>
+                <a16:creationId xmlns:a16="http://schemas.microsoft.com/office/drawing/2014/main" id="{CE67B29F-64F2-8AA2-2913-12A89ED8EF73}"/>
               </a:ext>
             </a:extLst>
           </p:cNvPr>
@@ -8598,8 +9150,8 @@
         </p:nvSpPr>
         <p:spPr>
           <a:xfrm>
-            <a:off x="5105398" y="1115568"/>
-            <a:ext cx="6245352" cy="4626864"/>
+            <a:off x="5105398" y="1507786"/>
+            <a:ext cx="6245352" cy="4234645"/>
           </a:xfrm>
         </p:spPr>
         <p:txBody>
@@ -8608,14 +9160,14 @@
           </a:bodyPr>
           <a:lstStyle/>
           <a:p>
-            <a:endParaRPr lang="en-US"/>
+            <a:endParaRPr lang="en-US" dirty="0"/>
           </a:p>
         </p:txBody>
       </p:sp>
     </p:spTree>
     <p:extLst>
       <p:ext uri="{BB962C8B-B14F-4D97-AF65-F5344CB8AC3E}">
-        <p14:creationId xmlns:p14="http://schemas.microsoft.com/office/powerpoint/2010/main" val="3985868732"/>
+        <p14:creationId xmlns:p14="http://schemas.microsoft.com/office/powerpoint/2010/main" val="1229409534"/>
       </p:ext>
     </p:extLst>
   </p:cSld>
@@ -8628,6 +9180,25 @@
 <file path=ppt/slides/slide9.xml><?xml version="1.0" encoding="utf-8"?>
 <p:sld xmlns:a="http://schemas.openxmlformats.org/drawingml/2006/main" xmlns:r="http://schemas.openxmlformats.org/officeDocument/2006/relationships" xmlns:p="http://schemas.openxmlformats.org/presentationml/2006/main">
   <p:cSld>
+    <p:bg>
+      <p:bgPr>
+        <a:blipFill rotWithShape="1">
+          <a:blip r:embed="rId2">
+            <a:duotone>
+              <a:schemeClr val="bg1">
+                <a:shade val="80000"/>
+                <a:lumMod val="80000"/>
+              </a:schemeClr>
+              <a:schemeClr val="bg1">
+                <a:tint val="98000"/>
+              </a:schemeClr>
+            </a:duotone>
+          </a:blip>
+          <a:stretch/>
+        </a:blipFill>
+        <a:effectLst/>
+      </p:bgPr>
+    </p:bg>
     <p:spTree>
       <p:nvGrpSpPr>
         <p:cNvPr id="1" name=""/>
@@ -8642,12 +9213,72 @@
           <a:chExt cx="0" cy="0"/>
         </a:xfrm>
       </p:grpSpPr>
+      <p:sp useBgFill="1">
+        <p:nvSpPr>
+          <p:cNvPr id="8" name="Rectangle 7">
+            <a:extLst>
+              <a:ext uri="{FF2B5EF4-FFF2-40B4-BE49-F238E27FC236}">
+                <a16:creationId xmlns:a16="http://schemas.microsoft.com/office/drawing/2014/main" id="{9A6C2C86-63BF-47D5-AA3F-905111A238E2}"/>
+              </a:ext>
+              <a:ext uri="{C183D7F6-B498-43B3-948B-1728B52AA6E4}">
+                <adec:decorative xmlns:adec="http://schemas.microsoft.com/office/drawing/2017/decorative" val="1"/>
+              </a:ext>
+            </a:extLst>
+          </p:cNvPr>
+          <p:cNvSpPr>
+            <a:spLocks noGrp="1" noRot="1" noChangeAspect="1" noMove="1" noResize="1" noEditPoints="1" noAdjustHandles="1" noChangeArrowheads="1" noChangeShapeType="1" noTextEdit="1"/>
+          </p:cNvSpPr>
+          <p:nvPr>
+            <p:extLst>
+              <p:ext uri="{386F3935-93C4-4BCD-93E2-E3B085C9AB24}">
+                <p16:designElem xmlns:p16="http://schemas.microsoft.com/office/powerpoint/2015/main" val="1"/>
+              </p:ext>
+            </p:extLst>
+          </p:nvPr>
+        </p:nvSpPr>
+        <p:spPr>
+          <a:xfrm>
+            <a:off x="0" y="0"/>
+            <a:ext cx="12192000" cy="6858000"/>
+          </a:xfrm>
+          <a:prstGeom prst="rect">
+            <a:avLst/>
+          </a:prstGeom>
+          <a:ln>
+            <a:noFill/>
+          </a:ln>
+        </p:spPr>
+        <p:style>
+          <a:lnRef idx="2">
+            <a:schemeClr val="accent1">
+              <a:shade val="50000"/>
+            </a:schemeClr>
+          </a:lnRef>
+          <a:fillRef idx="1">
+            <a:schemeClr val="accent1"/>
+          </a:fillRef>
+          <a:effectRef idx="0">
+            <a:schemeClr val="accent1"/>
+          </a:effectRef>
+          <a:fontRef idx="minor">
+            <a:schemeClr val="lt1"/>
+          </a:fontRef>
+        </p:style>
+        <p:txBody>
+          <a:bodyPr rtlCol="0" anchor="ctr"/>
+          <a:lstStyle/>
+          <a:p>
+            <a:pPr algn="ctr"/>
+            <a:endParaRPr lang="en-US"/>
+          </a:p>
+        </p:txBody>
+      </p:sp>
       <p:sp>
         <p:nvSpPr>
           <p:cNvPr id="2" name="Başlık 1">
             <a:extLst>
               <a:ext uri="{FF2B5EF4-FFF2-40B4-BE49-F238E27FC236}">
-                <a16:creationId xmlns:a16="http://schemas.microsoft.com/office/drawing/2014/main" id="{0156A4BB-940A-D45F-952D-D659E5394E5B}"/>
+                <a16:creationId xmlns:a16="http://schemas.microsoft.com/office/drawing/2014/main" id="{B6FFF6DC-56D6-C674-9CAC-2D22A647FA25}"/>
               </a:ext>
             </a:extLst>
           </p:cNvPr>
@@ -8660,30 +9291,86 @@
         </p:nvSpPr>
         <p:spPr>
           <a:xfrm>
-            <a:off x="834013" y="1115568"/>
-            <a:ext cx="3487616" cy="4626864"/>
+            <a:off x="0" y="0"/>
+            <a:ext cx="7266562" cy="1220820"/>
           </a:xfrm>
         </p:spPr>
         <p:txBody>
           <a:bodyPr>
-            <a:normAutofit/>
+            <a:noAutofit/>
           </a:bodyPr>
           <a:lstStyle/>
           <a:p>
             <a:pPr algn="l"/>
             <a:r>
-              <a:rPr lang="en-US" sz="3600" dirty="0"/>
-              <a:t>Conclusion</a:t>
-            </a:r>
-          </a:p>
-        </p:txBody>
-      </p:sp>
+              <a:rPr lang="tr-TR" dirty="0"/>
+              <a:t>Using </a:t>
+            </a:r>
+            <a:r>
+              <a:rPr lang="en-US" dirty="0"/>
+              <a:t>Taken’s Embedding</a:t>
+            </a:r>
+          </a:p>
+        </p:txBody>
+      </p:sp>
+      <p:cxnSp>
+        <p:nvCxnSpPr>
+          <p:cNvPr id="10" name="Straight Connector 9">
+            <a:extLst>
+              <a:ext uri="{FF2B5EF4-FFF2-40B4-BE49-F238E27FC236}">
+                <a16:creationId xmlns:a16="http://schemas.microsoft.com/office/drawing/2014/main" id="{425A0768-3044-4AA9-A889-D2CAA68C517A}"/>
+              </a:ext>
+              <a:ext uri="{C183D7F6-B498-43B3-948B-1728B52AA6E4}">
+                <adec:decorative xmlns:adec="http://schemas.microsoft.com/office/drawing/2017/decorative" val="1"/>
+              </a:ext>
+            </a:extLst>
+          </p:cNvPr>
+          <p:cNvCxnSpPr>
+            <a:cxnSpLocks noGrp="1" noRot="1" noChangeAspect="1" noMove="1" noResize="1" noEditPoints="1" noAdjustHandles="1" noChangeArrowheads="1" noChangeShapeType="1"/>
+          </p:cNvCxnSpPr>
+          <p:nvPr>
+            <p:extLst>
+              <p:ext uri="{386F3935-93C4-4BCD-93E2-E3B085C9AB24}">
+                <p16:designElem xmlns:p16="http://schemas.microsoft.com/office/powerpoint/2015/main" val="1"/>
+              </p:ext>
+            </p:extLst>
+          </p:nvPr>
+        </p:nvCxnSpPr>
+        <p:spPr>
+          <a:xfrm>
+            <a:off x="4654605" y="2057400"/>
+            <a:ext cx="0" cy="2743200"/>
+          </a:xfrm>
+          <a:prstGeom prst="line">
+            <a:avLst/>
+          </a:prstGeom>
+          <a:ln w="19050">
+            <a:solidFill>
+              <a:schemeClr val="tx2"/>
+            </a:solidFill>
+          </a:ln>
+        </p:spPr>
+        <p:style>
+          <a:lnRef idx="1">
+            <a:schemeClr val="accent1"/>
+          </a:lnRef>
+          <a:fillRef idx="0">
+            <a:schemeClr val="accent1"/>
+          </a:fillRef>
+          <a:effectRef idx="0">
+            <a:schemeClr val="accent1"/>
+          </a:effectRef>
+          <a:fontRef idx="minor">
+            <a:schemeClr val="tx1"/>
+          </a:fontRef>
+        </p:style>
+      </p:cxnSp>
       <p:sp>
         <p:nvSpPr>
           <p:cNvPr id="3" name="İçerik Yer Tutucusu 2">
             <a:extLst>
               <a:ext uri="{FF2B5EF4-FFF2-40B4-BE49-F238E27FC236}">
-                <a16:creationId xmlns:a16="http://schemas.microsoft.com/office/drawing/2014/main" id="{C46C0C0E-6C36-3332-D7B5-2A6E69D7AB3D}"/>
+                <a16:creationId xmlns:a16="http://schemas.microsoft.com/office/drawing/2014/main" id="{CE67B29F-64F2-8AA2-2913-12A89ED8EF73}"/>
               </a:ext>
             </a:extLst>
           </p:cNvPr>
@@ -8706,14 +9393,14 @@
           </a:bodyPr>
           <a:lstStyle/>
           <a:p>
-            <a:endParaRPr lang="en-US"/>
+            <a:endParaRPr lang="en-US" dirty="0"/>
           </a:p>
         </p:txBody>
       </p:sp>
     </p:spTree>
     <p:extLst>
       <p:ext uri="{BB962C8B-B14F-4D97-AF65-F5344CB8AC3E}">
-        <p14:creationId xmlns:p14="http://schemas.microsoft.com/office/powerpoint/2010/main" val="3032394955"/>
+        <p14:creationId xmlns:p14="http://schemas.microsoft.com/office/powerpoint/2010/main" val="2463473944"/>
       </p:ext>
     </p:extLst>
   </p:cSld>

</xml_diff>